<commit_message>
updated Lsn19 slides with forum excerpt and instructions on putting header in C template (last slide)
</commit_message>
<xml_diff>
--- a/notes/L19/Lsn19.pptx
+++ b/notes/L19/Lsn19.pptx
@@ -36,7 +36,7 @@
     <p:sldId id="410" r:id="rId24"/>
     <p:sldId id="411" r:id="rId25"/>
     <p:sldId id="412" r:id="rId26"/>
-    <p:sldId id="413" r:id="rId27"/>
+    <p:sldId id="417" r:id="rId27"/>
   </p:sldIdLst>
   <p:sldSz cx="9144000" cy="6858000" type="screen4x3"/>
   <p:notesSz cx="6985000" cy="9283700"/>
@@ -11313,7 +11313,7 @@
             <p:ph idx="1"/>
             <p:extLst>
               <p:ext uri="{D42A27DB-BD31-4B8C-83A1-F6EECF244321}">
-                <p14:modId xmlns:p14="http://schemas.microsoft.com/office/powerpoint/2010/main" val="2381397866"/>
+                <p14:modId xmlns:p14="http://schemas.microsoft.com/office/powerpoint/2010/main" val="1078524143"/>
               </p:ext>
             </p:extLst>
           </p:nvPr>
@@ -12325,11 +12325,20 @@
                     <a:p>
                       <a:pPr algn="ctr" fontAlgn="t"/>
                       <a:r>
-                        <a:rPr lang="en-US" sz="1200" dirty="0">
+                        <a:rPr lang="en-US" sz="1200" b="1" dirty="0">
                           <a:effectLst/>
                         </a:rPr>
-                        <a:t>COB L19</a:t>
+                        <a:t>COB </a:t>
                       </a:r>
+                      <a:r>
+                        <a:rPr lang="en-US" sz="1200" b="1" dirty="0" smtClean="0">
+                          <a:effectLst/>
+                        </a:rPr>
+                        <a:t>L20</a:t>
+                      </a:r>
+                      <a:endParaRPr lang="en-US" sz="1200" b="1" dirty="0">
+                        <a:effectLst/>
+                      </a:endParaRPr>
                     </a:p>
                   </a:txBody>
                   <a:tcPr marL="26904" marR="26904" marT="26904" marB="26904">
@@ -12370,7 +12379,7 @@
                       <a:tailEnd type="none" w="med" len="med"/>
                     </a:lnB>
                     <a:solidFill>
-                      <a:srgbClr val="FFFFFF"/>
+                      <a:srgbClr val="FFFF00"/>
                     </a:solidFill>
                   </a:tcPr>
                 </a:tc>
@@ -13616,7 +13625,7 @@
                     <a:p>
                       <a:pPr algn="ctr" fontAlgn="t"/>
                       <a:r>
-                        <a:rPr lang="en-US" sz="1200" dirty="0">
+                        <a:rPr lang="en-US" sz="1200" b="1" dirty="0">
                           <a:effectLst/>
                         </a:rPr>
                         <a:t>10</a:t>
@@ -13661,7 +13670,7 @@
                       <a:tailEnd type="none" w="med" len="med"/>
                     </a:lnB>
                     <a:solidFill>
-                      <a:srgbClr val="FFFFFF"/>
+                      <a:srgbClr val="FFFF00"/>
                     </a:solidFill>
                   </a:tcPr>
                 </a:tc>
@@ -13725,18 +13734,18 @@
                     <a:p>
                       <a:pPr algn="ctr" fontAlgn="t"/>
                       <a:r>
-                        <a:rPr lang="en-US" sz="1200" dirty="0">
+                        <a:rPr lang="en-US" sz="1200" b="1" dirty="0">
                           <a:effectLst/>
                         </a:rPr>
                         <a:t>COB </a:t>
                       </a:r>
                       <a:r>
-                        <a:rPr lang="en-US" sz="1200" dirty="0" smtClean="0">
+                        <a:rPr lang="en-US" sz="1200" b="1" dirty="0" smtClean="0">
                           <a:effectLst/>
                         </a:rPr>
                         <a:t>L20</a:t>
                       </a:r>
-                      <a:endParaRPr lang="en-US" sz="1200" dirty="0">
+                      <a:endParaRPr lang="en-US" sz="1200" b="1" dirty="0">
                         <a:effectLst/>
                       </a:endParaRPr>
                     </a:p>
@@ -13779,7 +13788,7 @@
                       <a:tailEnd type="none" w="med" len="med"/>
                     </a:lnB>
                     <a:solidFill>
-                      <a:srgbClr val="FFFFFF"/>
+                      <a:srgbClr val="FFFF00"/>
                     </a:solidFill>
                   </a:tcPr>
                 </a:tc>
@@ -18262,7 +18271,7 @@
         <p:spPr>
           <a:xfrm>
             <a:off x="275129" y="629194"/>
-            <a:ext cx="8868871" cy="5035231"/>
+            <a:ext cx="8868871" cy="6228806"/>
           </a:xfrm>
         </p:spPr>
         <p:txBody>
@@ -18273,7 +18282,7 @@
               <a:buNone/>
             </a:pPr>
             <a:r>
-              <a:rPr lang="en-US" sz="1400" b="1" dirty="0">
+              <a:rPr lang="en-US" sz="1000" b="1" dirty="0">
                 <a:solidFill>
                   <a:srgbClr val="00B050"/>
                 </a:solidFill>
@@ -18288,7 +18297,7 @@
               <a:buNone/>
             </a:pPr>
             <a:r>
-              <a:rPr lang="en-US" sz="1400" b="1" dirty="0">
+              <a:rPr lang="en-US" sz="1000" b="1" dirty="0">
                 <a:solidFill>
                   <a:srgbClr val="00B050"/>
                 </a:solidFill>
@@ -18303,7 +18312,7 @@
               <a:buNone/>
             </a:pPr>
             <a:r>
-              <a:rPr lang="en-US" sz="1400" b="1" dirty="0">
+              <a:rPr lang="en-US" sz="1000" b="1" dirty="0">
                 <a:solidFill>
                   <a:srgbClr val="00B050"/>
                 </a:solidFill>
@@ -18318,7 +18327,7 @@
               <a:buNone/>
             </a:pPr>
             <a:r>
-              <a:rPr lang="en-US" sz="1400" b="1" dirty="0">
+              <a:rPr lang="en-US" sz="1000" b="1" dirty="0">
                 <a:solidFill>
                   <a:srgbClr val="00B050"/>
                 </a:solidFill>
@@ -18333,7 +18342,7 @@
               <a:buNone/>
             </a:pPr>
             <a:r>
-              <a:rPr lang="en-US" sz="1400" b="1" dirty="0">
+              <a:rPr lang="en-US" sz="1000" b="1" dirty="0">
                 <a:solidFill>
                   <a:srgbClr val="00B050"/>
                 </a:solidFill>
@@ -18348,7 +18357,7 @@
               <a:buNone/>
             </a:pPr>
             <a:r>
-              <a:rPr lang="en-US" sz="1400" b="1" dirty="0">
+              <a:rPr lang="en-US" sz="1000" b="1" dirty="0">
                 <a:solidFill>
                   <a:srgbClr val="00B050"/>
                 </a:solidFill>
@@ -18362,7 +18371,7 @@
             <a:pPr marL="400050" lvl="1" indent="0">
               <a:buNone/>
             </a:pPr>
-            <a:endParaRPr lang="en-US" sz="1400" b="1" dirty="0">
+            <a:endParaRPr lang="en-US" sz="1000" b="1" dirty="0">
               <a:solidFill>
                 <a:srgbClr val="00B050"/>
               </a:solidFill>
@@ -18375,7 +18384,7 @@
               <a:buNone/>
             </a:pPr>
             <a:r>
-              <a:rPr lang="en-US" sz="1400" b="1" dirty="0" err="1">
+              <a:rPr lang="en-US" sz="1000" b="1" dirty="0" err="1">
                 <a:solidFill>
                   <a:srgbClr val="00B050"/>
                 </a:solidFill>
@@ -18385,7 +18394,7 @@
               <a:t>Purp:A</a:t>
             </a:r>
             <a:r>
-              <a:rPr lang="en-US" sz="1400" b="1" dirty="0">
+              <a:rPr lang="en-US" sz="1000" b="1" dirty="0">
                 <a:solidFill>
                   <a:srgbClr val="00B050"/>
                 </a:solidFill>
@@ -18400,7 +18409,7 @@
               <a:buNone/>
             </a:pPr>
             <a:r>
-              <a:rPr lang="en-US" sz="1400" b="1" dirty="0">
+              <a:rPr lang="en-US" sz="1000" b="1" dirty="0">
                 <a:solidFill>
                   <a:srgbClr val="00B050"/>
                 </a:solidFill>
@@ -18414,7 +18423,7 @@
             <a:pPr marL="400050" lvl="1" indent="0">
               <a:buNone/>
             </a:pPr>
-            <a:endParaRPr lang="en-US" sz="1400" b="1" dirty="0">
+            <a:endParaRPr lang="en-US" sz="1000" b="1" dirty="0">
               <a:solidFill>
                 <a:srgbClr val="00B050"/>
               </a:solidFill>
@@ -18427,7 +18436,7 @@
               <a:buNone/>
             </a:pPr>
             <a:r>
-              <a:rPr lang="en-US" sz="1400" b="1" dirty="0">
+              <a:rPr lang="en-US" sz="1000" b="1" dirty="0">
                 <a:solidFill>
                   <a:srgbClr val="00B050"/>
                 </a:solidFill>
@@ -18442,7 +18451,7 @@
               <a:buNone/>
             </a:pPr>
             <a:r>
-              <a:rPr lang="en-US" sz="1400" b="1" dirty="0">
+              <a:rPr lang="en-US" sz="1000" b="1" dirty="0">
                 <a:solidFill>
                   <a:srgbClr val="00B050"/>
                 </a:solidFill>
@@ -18456,7 +18465,7 @@
             <a:pPr marL="400050" lvl="1" indent="0">
               <a:buNone/>
             </a:pPr>
-            <a:endParaRPr lang="en-US" sz="1400" b="1" dirty="0">
+            <a:endParaRPr lang="en-US" sz="1000" b="1" dirty="0">
               <a:solidFill>
                 <a:srgbClr val="00B050"/>
               </a:solidFill>
@@ -18469,7 +18478,7 @@
               <a:buNone/>
             </a:pPr>
             <a:r>
-              <a:rPr lang="en-US" sz="1400" b="1" dirty="0">
+              <a:rPr lang="en-US" sz="1000" b="1" dirty="0">
                 <a:solidFill>
                   <a:srgbClr val="00B050"/>
                 </a:solidFill>
@@ -18484,7 +18493,7 @@
               <a:buNone/>
             </a:pPr>
             <a:r>
-              <a:rPr lang="en-US" sz="1400" b="1" dirty="0">
+              <a:rPr lang="en-US" sz="1000" b="1" dirty="0">
                 <a:solidFill>
                   <a:srgbClr val="00B050"/>
                 </a:solidFill>
@@ -18499,7 +18508,7 @@
               <a:buNone/>
             </a:pPr>
             <a:r>
-              <a:rPr lang="en-US" sz="1400" b="1" dirty="0">
+              <a:rPr lang="en-US" sz="1000" b="1" dirty="0">
                 <a:solidFill>
                   <a:srgbClr val="00B050"/>
                 </a:solidFill>
@@ -18514,7 +18523,7 @@
               <a:buNone/>
             </a:pPr>
             <a:r>
-              <a:rPr lang="en-US" sz="1400" b="1" dirty="0">
+              <a:rPr lang="en-US" sz="1000" b="1" dirty="0">
                 <a:solidFill>
                   <a:srgbClr val="00B050"/>
                 </a:solidFill>
@@ -18529,7 +18538,7 @@
               <a:buNone/>
             </a:pPr>
             <a:r>
-              <a:rPr lang="en-US" sz="1400" b="1" dirty="0">
+              <a:rPr lang="en-US" sz="1000" b="1" dirty="0">
                 <a:solidFill>
                   <a:srgbClr val="00B050"/>
                 </a:solidFill>
@@ -18544,7 +18553,7 @@
               <a:buNone/>
             </a:pPr>
             <a:r>
-              <a:rPr lang="en-US" sz="1400" b="1" dirty="0">
+              <a:rPr lang="en-US" sz="1000" b="1" dirty="0">
                 <a:solidFill>
                   <a:srgbClr val="00B050"/>
                 </a:solidFill>
@@ -18559,7 +18568,7 @@
               <a:buNone/>
             </a:pPr>
             <a:r>
-              <a:rPr lang="en-US" sz="1400" b="1" dirty="0">
+              <a:rPr lang="en-US" sz="1000" b="1" dirty="0">
                 <a:solidFill>
                   <a:srgbClr val="00B050"/>
                 </a:solidFill>
@@ -18568,7 +18577,7 @@
               </a:rPr>
               <a:t>-------------------------------------------------------------------------*/</a:t>
             </a:r>
-            <a:endParaRPr lang="en-US" sz="1400" b="1" dirty="0" smtClean="0">
+            <a:endParaRPr lang="en-US" sz="1000" b="1" dirty="0" smtClean="0">
               <a:solidFill>
                 <a:srgbClr val="00B050"/>
               </a:solidFill>
@@ -18580,7 +18589,74 @@
             <a:pPr marL="400050" lvl="1" indent="0">
               <a:buNone/>
             </a:pPr>
-            <a:endParaRPr lang="en-US" sz="1400" b="1" dirty="0">
+            <a:endParaRPr lang="en-US" sz="1200" b="1" dirty="0" smtClean="0">
+              <a:solidFill>
+                <a:schemeClr val="accent2"/>
+              </a:solidFill>
+              <a:latin typeface="Courier New" pitchFamily="49" charset="0"/>
+              <a:cs typeface="Courier New" pitchFamily="49" charset="0"/>
+            </a:endParaRPr>
+          </a:p>
+          <a:p>
+            <a:pPr marL="400050" lvl="1" indent="0">
+              <a:buNone/>
+            </a:pPr>
+            <a:r>
+              <a:rPr lang="en-US" sz="1200" b="1" dirty="0" smtClean="0">
+                <a:solidFill>
+                  <a:schemeClr val="accent2"/>
+                </a:solidFill>
+                <a:latin typeface="Courier New" pitchFamily="49" charset="0"/>
+                <a:cs typeface="Courier New" pitchFamily="49" charset="0"/>
+              </a:rPr>
+              <a:t>Want to edit your default empty C template???  Then modify:</a:t>
+            </a:r>
+          </a:p>
+          <a:p>
+            <a:pPr marL="571500" lvl="1" indent="-171450"/>
+            <a:r>
+              <a:rPr lang="en-US" sz="1200" b="1" dirty="0" smtClean="0">
+                <a:solidFill>
+                  <a:schemeClr val="accent2"/>
+                </a:solidFill>
+                <a:latin typeface="Courier New" pitchFamily="49" charset="0"/>
+                <a:cs typeface="Courier New" pitchFamily="49" charset="0"/>
+              </a:rPr>
+              <a:t>C</a:t>
+            </a:r>
+            <a:r>
+              <a:rPr lang="en-US" sz="1200" b="1" dirty="0">
+                <a:solidFill>
+                  <a:schemeClr val="accent2"/>
+                </a:solidFill>
+                <a:latin typeface="Courier New" pitchFamily="49" charset="0"/>
+                <a:cs typeface="Courier New" pitchFamily="49" charset="0"/>
+              </a:rPr>
+              <a:t>:\</a:t>
+            </a:r>
+            <a:r>
+              <a:rPr lang="en-US" sz="1200" b="1" dirty="0" smtClean="0">
+                <a:solidFill>
+                  <a:schemeClr val="accent2"/>
+                </a:solidFill>
+                <a:latin typeface="Courier New" pitchFamily="49" charset="0"/>
+                <a:cs typeface="Courier New" pitchFamily="49" charset="0"/>
+              </a:rPr>
+              <a:t>ti\ccsv6\eclipse\plugins\com.ti.ccstudio.project.templates_6.1.0.201502111100\resources\msp430\empty\main.c</a:t>
+            </a:r>
+            <a:endParaRPr lang="en-US" sz="1200" b="1" dirty="0">
+              <a:solidFill>
+                <a:schemeClr val="accent2"/>
+              </a:solidFill>
+              <a:latin typeface="Courier New" pitchFamily="49" charset="0"/>
+              <a:cs typeface="Courier New" pitchFamily="49" charset="0"/>
+            </a:endParaRPr>
+          </a:p>
+          <a:p>
+            <a:pPr marL="400050" lvl="1" indent="0">
+              <a:buNone/>
+            </a:pPr>
+            <a:endParaRPr lang="en-US" sz="1200" b="1" dirty="0">
               <a:solidFill>
                 <a:srgbClr val="00B050"/>
               </a:solidFill>
@@ -18593,7 +18669,7 @@
               <a:buNone/>
             </a:pPr>
             <a:r>
-              <a:rPr lang="en-US" sz="1600" b="1" dirty="0" smtClean="0">
+              <a:rPr lang="en-US" sz="1200" b="1" dirty="0" smtClean="0">
                 <a:solidFill>
                   <a:schemeClr val="accent2"/>
                 </a:solidFill>
@@ -18603,7 +18679,7 @@
               <a:t>Try Assignment </a:t>
             </a:r>
             <a:r>
-              <a:rPr lang="en-US" sz="1600" b="1" dirty="0">
+              <a:rPr lang="en-US" sz="1200" b="1" dirty="0">
                 <a:solidFill>
                   <a:schemeClr val="accent2"/>
                 </a:solidFill>
@@ -18613,7 +18689,7 @@
               <a:t>6</a:t>
             </a:r>
             <a:r>
-              <a:rPr lang="en-US" sz="1600" b="1" dirty="0" smtClean="0">
+              <a:rPr lang="en-US" sz="1200" b="1" dirty="0" smtClean="0">
                 <a:solidFill>
                   <a:schemeClr val="accent2"/>
                 </a:solidFill>
@@ -18628,7 +18704,7 @@
               <a:buNone/>
             </a:pPr>
             <a:r>
-              <a:rPr lang="en-US" sz="1600" b="1" dirty="0">
+              <a:rPr lang="en-US" sz="1200" b="1" dirty="0">
                 <a:solidFill>
                   <a:schemeClr val="accent2"/>
                 </a:solidFill>
@@ -18638,7 +18714,7 @@
               <a:t>          </a:t>
             </a:r>
             <a:r>
-              <a:rPr lang="en-US" sz="1600" b="1" dirty="0">
+              <a:rPr lang="en-US" sz="1200" b="1" dirty="0">
                 <a:solidFill>
                   <a:schemeClr val="accent2"/>
                 </a:solidFill>
@@ -18648,7 +18724,7 @@
               </a:rPr>
               <a:t>http://ece.ninja/382/notes/L19/L19_C_basics.html</a:t>
             </a:r>
-            <a:endParaRPr lang="en-US" sz="1600" b="1" dirty="0" smtClean="0">
+            <a:endParaRPr lang="en-US" sz="1200" b="1" dirty="0" smtClean="0">
               <a:solidFill>
                 <a:schemeClr val="accent2"/>
               </a:solidFill>
@@ -18661,7 +18737,7 @@
     </p:spTree>
     <p:extLst>
       <p:ext uri="{BB962C8B-B14F-4D97-AF65-F5344CB8AC3E}">
-        <p14:creationId xmlns:p14="http://schemas.microsoft.com/office/powerpoint/2010/main" val="3463679174"/>
+        <p14:creationId xmlns:p14="http://schemas.microsoft.com/office/powerpoint/2010/main" val="2272572103"/>
       </p:ext>
     </p:extLst>
   </p:cSld>
@@ -19158,6 +19234,57 @@
               <a:rPr lang="en-US" sz="2400" dirty="0"/>
               <a:t> </a:t>
             </a:r>
+            <a:endParaRPr lang="en-US" sz="2400" dirty="0" smtClean="0"/>
+          </a:p>
+          <a:p>
+            <a:pPr marL="0" indent="0">
+              <a:buNone/>
+            </a:pPr>
+            <a:endParaRPr lang="en-US" sz="2400" dirty="0" smtClean="0">
+              <a:hlinkClick r:id="rId3"/>
+            </a:endParaRPr>
+          </a:p>
+          <a:p>
+            <a:endParaRPr lang="en-US" sz="2400" dirty="0" smtClean="0">
+              <a:hlinkClick r:id="rId3"/>
+            </a:endParaRPr>
+          </a:p>
+          <a:p>
+            <a:endParaRPr lang="en-US" sz="2400" dirty="0">
+              <a:hlinkClick r:id="rId3"/>
+            </a:endParaRPr>
+          </a:p>
+          <a:p>
+            <a:endParaRPr lang="en-US" sz="2400" dirty="0" smtClean="0">
+              <a:hlinkClick r:id="rId3"/>
+            </a:endParaRPr>
+          </a:p>
+          <a:p>
+            <a:endParaRPr lang="en-US" sz="2400" dirty="0">
+              <a:hlinkClick r:id="rId3"/>
+            </a:endParaRPr>
+          </a:p>
+          <a:p>
+            <a:endParaRPr lang="en-US" sz="2400" dirty="0" smtClean="0">
+              <a:hlinkClick r:id="rId3"/>
+            </a:endParaRPr>
+          </a:p>
+          <a:p>
+            <a:endParaRPr lang="en-US" sz="2400" dirty="0">
+              <a:hlinkClick r:id="rId3"/>
+            </a:endParaRPr>
+          </a:p>
+          <a:p>
+            <a:endParaRPr lang="en-US" sz="2400" dirty="0" smtClean="0">
+              <a:hlinkClick r:id="rId3"/>
+            </a:endParaRPr>
+          </a:p>
+          <a:p>
+            <a:endParaRPr lang="en-US" sz="2400" dirty="0">
+              <a:hlinkClick r:id="rId3"/>
+            </a:endParaRPr>
+          </a:p>
+          <a:p>
             <a:endParaRPr lang="en-US" sz="2400" dirty="0" smtClean="0">
               <a:hlinkClick r:id="rId3"/>
             </a:endParaRPr>
@@ -19210,6 +19337,60 @@
           </a:p>
         </p:txBody>
       </p:sp>
+      <p:pic>
+        <p:nvPicPr>
+          <p:cNvPr id="1026" name="Picture 2"/>
+          <p:cNvPicPr>
+            <a:picLocks noChangeAspect="1" noChangeArrowheads="1"/>
+          </p:cNvPicPr>
+          <p:nvPr/>
+        </p:nvPicPr>
+        <p:blipFill>
+          <a:blip r:embed="rId4">
+            <a:extLst>
+              <a:ext uri="{28A0092B-C50C-407E-A947-70E740481C1C}">
+                <a14:useLocalDpi xmlns:a14="http://schemas.microsoft.com/office/drawing/2010/main" val="0"/>
+              </a:ext>
+            </a:extLst>
+          </a:blip>
+          <a:srcRect/>
+          <a:stretch>
+            <a:fillRect/>
+          </a:stretch>
+        </p:blipFill>
+        <p:spPr bwMode="auto">
+          <a:xfrm>
+            <a:off x="730203" y="1359056"/>
+            <a:ext cx="7219950" cy="3933825"/>
+          </a:xfrm>
+          <a:prstGeom prst="rect">
+            <a:avLst/>
+          </a:prstGeom>
+          <a:noFill/>
+          <a:ln>
+            <a:noFill/>
+          </a:ln>
+          <a:extLst>
+            <a:ext uri="{909E8E84-426E-40DD-AFC4-6F175D3DCCD1}">
+              <a14:hiddenFill xmlns:a14="http://schemas.microsoft.com/office/drawing/2010/main">
+                <a:solidFill>
+                  <a:schemeClr val="accent1"/>
+                </a:solidFill>
+              </a14:hiddenFill>
+            </a:ext>
+            <a:ext uri="{91240B29-F687-4F45-9708-019B960494DF}">
+              <a14:hiddenLine xmlns:a14="http://schemas.microsoft.com/office/drawing/2010/main" w="9525">
+                <a:solidFill>
+                  <a:schemeClr val="tx1"/>
+                </a:solidFill>
+                <a:miter lim="800000"/>
+                <a:headEnd/>
+                <a:tailEnd/>
+              </a14:hiddenLine>
+            </a:ext>
+          </a:extLst>
+        </p:spPr>
+      </p:pic>
     </p:spTree>
     <p:extLst>
       <p:ext uri="{BB962C8B-B14F-4D97-AF65-F5344CB8AC3E}">

</xml_diff>